<commit_message>
New changes from meeting on Friday April 6
Revised folder structure, organized everything

Early prototypes are now grouped together
Added folder in trunk/docs for UML diagrams
Added UML diagram for FileOps1
</commit_message>
<xml_diff>
--- a/trunk/docs/TeamFE-ArchDiagram.pptx
+++ b/trunk/docs/TeamFE-ArchDiagram.pptx
@@ -104,11 +104,12 @@
       </a:defRPr>
     </a:lvl9pPr>
   </p:defaultTextStyle>
+  <p:extLst>
+    <p:ext uri="{EFAFB233-063F-42B5-8137-9DF3F51BA10A}">
+      <p15:sldGuideLst xmlns:p15="http://schemas.microsoft.com/office/powerpoint/2012/main"/>
+    </p:ext>
+  </p:extLst>
 </p:presentation>
-</file>
-
-<file path=ppt/revisionInfo.xml><?xml version="1.0" encoding="utf-8"?>
-<p1510:revInfo xmlns:a="http://schemas.openxmlformats.org/drawingml/2006/main" xmlns:r="http://schemas.openxmlformats.org/officeDocument/2006/relationships" xmlns:p1510="http://schemas.microsoft.com/office/powerpoint/2015/10/main"/>
 </file>
 
 <file path=ppt/slideLayouts/slideLayout1.xml><?xml version="1.0" encoding="utf-8"?>
@@ -258,7 +259,7 @@
           <a:p>
             <a:fld id="{79E0B548-C4D5-4285-B604-F51FACC0DC43}" type="datetimeFigureOut">
               <a:rPr lang="en-US" smtClean="0"/>
-              <a:t>4/4/2018</a:t>
+              <a:t>2018-04-06</a:t>
             </a:fld>
             <a:endParaRPr lang="en-US"/>
           </a:p>
@@ -456,7 +457,7 @@
           <a:p>
             <a:fld id="{79E0B548-C4D5-4285-B604-F51FACC0DC43}" type="datetimeFigureOut">
               <a:rPr lang="en-US" smtClean="0"/>
-              <a:t>4/4/2018</a:t>
+              <a:t>2018-04-06</a:t>
             </a:fld>
             <a:endParaRPr lang="en-US"/>
           </a:p>
@@ -664,7 +665,7 @@
           <a:p>
             <a:fld id="{79E0B548-C4D5-4285-B604-F51FACC0DC43}" type="datetimeFigureOut">
               <a:rPr lang="en-US" smtClean="0"/>
-              <a:t>4/4/2018</a:t>
+              <a:t>2018-04-06</a:t>
             </a:fld>
             <a:endParaRPr lang="en-US"/>
           </a:p>
@@ -862,7 +863,7 @@
           <a:p>
             <a:fld id="{79E0B548-C4D5-4285-B604-F51FACC0DC43}" type="datetimeFigureOut">
               <a:rPr lang="en-US" smtClean="0"/>
-              <a:t>4/4/2018</a:t>
+              <a:t>2018-04-06</a:t>
             </a:fld>
             <a:endParaRPr lang="en-US"/>
           </a:p>
@@ -1137,7 +1138,7 @@
           <a:p>
             <a:fld id="{79E0B548-C4D5-4285-B604-F51FACC0DC43}" type="datetimeFigureOut">
               <a:rPr lang="en-US" smtClean="0"/>
-              <a:t>4/4/2018</a:t>
+              <a:t>2018-04-06</a:t>
             </a:fld>
             <a:endParaRPr lang="en-US"/>
           </a:p>
@@ -1402,7 +1403,7 @@
           <a:p>
             <a:fld id="{79E0B548-C4D5-4285-B604-F51FACC0DC43}" type="datetimeFigureOut">
               <a:rPr lang="en-US" smtClean="0"/>
-              <a:t>4/4/2018</a:t>
+              <a:t>2018-04-06</a:t>
             </a:fld>
             <a:endParaRPr lang="en-US"/>
           </a:p>
@@ -1814,7 +1815,7 @@
           <a:p>
             <a:fld id="{79E0B548-C4D5-4285-B604-F51FACC0DC43}" type="datetimeFigureOut">
               <a:rPr lang="en-US" smtClean="0"/>
-              <a:t>4/4/2018</a:t>
+              <a:t>2018-04-06</a:t>
             </a:fld>
             <a:endParaRPr lang="en-US"/>
           </a:p>
@@ -1955,7 +1956,7 @@
           <a:p>
             <a:fld id="{79E0B548-C4D5-4285-B604-F51FACC0DC43}" type="datetimeFigureOut">
               <a:rPr lang="en-US" smtClean="0"/>
-              <a:t>4/4/2018</a:t>
+              <a:t>2018-04-06</a:t>
             </a:fld>
             <a:endParaRPr lang="en-US"/>
           </a:p>
@@ -2068,7 +2069,7 @@
           <a:p>
             <a:fld id="{79E0B548-C4D5-4285-B604-F51FACC0DC43}" type="datetimeFigureOut">
               <a:rPr lang="en-US" smtClean="0"/>
-              <a:t>4/4/2018</a:t>
+              <a:t>2018-04-06</a:t>
             </a:fld>
             <a:endParaRPr lang="en-US"/>
           </a:p>
@@ -2379,7 +2380,7 @@
           <a:p>
             <a:fld id="{79E0B548-C4D5-4285-B604-F51FACC0DC43}" type="datetimeFigureOut">
               <a:rPr lang="en-US" smtClean="0"/>
-              <a:t>4/4/2018</a:t>
+              <a:t>2018-04-06</a:t>
             </a:fld>
             <a:endParaRPr lang="en-US"/>
           </a:p>
@@ -2667,7 +2668,7 @@
           <a:p>
             <a:fld id="{79E0B548-C4D5-4285-B604-F51FACC0DC43}" type="datetimeFigureOut">
               <a:rPr lang="en-US" smtClean="0"/>
-              <a:t>4/4/2018</a:t>
+              <a:t>2018-04-06</a:t>
             </a:fld>
             <a:endParaRPr lang="en-US"/>
           </a:p>
@@ -2908,7 +2909,7 @@
           <a:p>
             <a:fld id="{79E0B548-C4D5-4285-B604-F51FACC0DC43}" type="datetimeFigureOut">
               <a:rPr lang="en-US" smtClean="0"/>
-              <a:t>4/4/2018</a:t>
+              <a:t>2018-04-06</a:t>
             </a:fld>
             <a:endParaRPr lang="en-US"/>
           </a:p>
@@ -3705,23 +3706,7 @@
                   <a:schemeClr val="tx1"/>
                 </a:solidFill>
               </a:rPr>
-              <a:t>&lt;</a:t>
-            </a:r>
-            <a:r>
-              <a:rPr lang="en-US" sz="1200" dirty="0" err="1">
-                <a:solidFill>
-                  <a:schemeClr val="tx1"/>
-                </a:solidFill>
-              </a:rPr>
-              <a:t>Quesiton</a:t>
-            </a:r>
-            <a:r>
-              <a:rPr lang="en-US" sz="1200" dirty="0">
-                <a:solidFill>
-                  <a:schemeClr val="tx1"/>
-                </a:solidFill>
-              </a:rPr>
-              <a:t>&gt;</a:t>
+              <a:t>&lt;Question&gt;</a:t>
             </a:r>
           </a:p>
           <a:p>

</xml_diff>

<commit_message>
Added update arch diagram images
</commit_message>
<xml_diff>
--- a/trunk/docs/TeamFE-ArchDiagram.pptx
+++ b/trunk/docs/TeamFE-ArchDiagram.pptx
@@ -259,7 +259,7 @@
           <a:p>
             <a:fld id="{79E0B548-C4D5-4285-B604-F51FACC0DC43}" type="datetimeFigureOut">
               <a:rPr lang="en-US" smtClean="0"/>
-              <a:t>2018-04-06</a:t>
+              <a:t>2018-04-13</a:t>
             </a:fld>
             <a:endParaRPr lang="en-US"/>
           </a:p>
@@ -457,7 +457,7 @@
           <a:p>
             <a:fld id="{79E0B548-C4D5-4285-B604-F51FACC0DC43}" type="datetimeFigureOut">
               <a:rPr lang="en-US" smtClean="0"/>
-              <a:t>2018-04-06</a:t>
+              <a:t>2018-04-13</a:t>
             </a:fld>
             <a:endParaRPr lang="en-US"/>
           </a:p>
@@ -665,7 +665,7 @@
           <a:p>
             <a:fld id="{79E0B548-C4D5-4285-B604-F51FACC0DC43}" type="datetimeFigureOut">
               <a:rPr lang="en-US" smtClean="0"/>
-              <a:t>2018-04-06</a:t>
+              <a:t>2018-04-13</a:t>
             </a:fld>
             <a:endParaRPr lang="en-US"/>
           </a:p>
@@ -863,7 +863,7 @@
           <a:p>
             <a:fld id="{79E0B548-C4D5-4285-B604-F51FACC0DC43}" type="datetimeFigureOut">
               <a:rPr lang="en-US" smtClean="0"/>
-              <a:t>2018-04-06</a:t>
+              <a:t>2018-04-13</a:t>
             </a:fld>
             <a:endParaRPr lang="en-US"/>
           </a:p>
@@ -1138,7 +1138,7 @@
           <a:p>
             <a:fld id="{79E0B548-C4D5-4285-B604-F51FACC0DC43}" type="datetimeFigureOut">
               <a:rPr lang="en-US" smtClean="0"/>
-              <a:t>2018-04-06</a:t>
+              <a:t>2018-04-13</a:t>
             </a:fld>
             <a:endParaRPr lang="en-US"/>
           </a:p>
@@ -1403,7 +1403,7 @@
           <a:p>
             <a:fld id="{79E0B548-C4D5-4285-B604-F51FACC0DC43}" type="datetimeFigureOut">
               <a:rPr lang="en-US" smtClean="0"/>
-              <a:t>2018-04-06</a:t>
+              <a:t>2018-04-13</a:t>
             </a:fld>
             <a:endParaRPr lang="en-US"/>
           </a:p>
@@ -1815,7 +1815,7 @@
           <a:p>
             <a:fld id="{79E0B548-C4D5-4285-B604-F51FACC0DC43}" type="datetimeFigureOut">
               <a:rPr lang="en-US" smtClean="0"/>
-              <a:t>2018-04-06</a:t>
+              <a:t>2018-04-13</a:t>
             </a:fld>
             <a:endParaRPr lang="en-US"/>
           </a:p>
@@ -1956,7 +1956,7 @@
           <a:p>
             <a:fld id="{79E0B548-C4D5-4285-B604-F51FACC0DC43}" type="datetimeFigureOut">
               <a:rPr lang="en-US" smtClean="0"/>
-              <a:t>2018-04-06</a:t>
+              <a:t>2018-04-13</a:t>
             </a:fld>
             <a:endParaRPr lang="en-US"/>
           </a:p>
@@ -2069,7 +2069,7 @@
           <a:p>
             <a:fld id="{79E0B548-C4D5-4285-B604-F51FACC0DC43}" type="datetimeFigureOut">
               <a:rPr lang="en-US" smtClean="0"/>
-              <a:t>2018-04-06</a:t>
+              <a:t>2018-04-13</a:t>
             </a:fld>
             <a:endParaRPr lang="en-US"/>
           </a:p>
@@ -2380,7 +2380,7 @@
           <a:p>
             <a:fld id="{79E0B548-C4D5-4285-B604-F51FACC0DC43}" type="datetimeFigureOut">
               <a:rPr lang="en-US" smtClean="0"/>
-              <a:t>2018-04-06</a:t>
+              <a:t>2018-04-13</a:t>
             </a:fld>
             <a:endParaRPr lang="en-US"/>
           </a:p>
@@ -2668,7 +2668,7 @@
           <a:p>
             <a:fld id="{79E0B548-C4D5-4285-B604-F51FACC0DC43}" type="datetimeFigureOut">
               <a:rPr lang="en-US" smtClean="0"/>
-              <a:t>2018-04-06</a:t>
+              <a:t>2018-04-13</a:t>
             </a:fld>
             <a:endParaRPr lang="en-US"/>
           </a:p>
@@ -2909,7 +2909,7 @@
           <a:p>
             <a:fld id="{79E0B548-C4D5-4285-B604-F51FACC0DC43}" type="datetimeFigureOut">
               <a:rPr lang="en-US" smtClean="0"/>
-              <a:t>2018-04-06</a:t>
+              <a:t>2018-04-13</a:t>
             </a:fld>
             <a:endParaRPr lang="en-US"/>
           </a:p>

</xml_diff>